<commit_message>
Update itk asic presentation 23_06.pptx
</commit_message>
<xml_diff>
--- a/itk asic presentation 23_06.pptx
+++ b/itk asic presentation 23_06.pptx
@@ -4247,14 +4247,14 @@
                 <a:latin typeface="Times New Roman" panose="02020603050405020304" pitchFamily="18" charset="0"/>
                 <a:cs typeface="Times New Roman" panose="02020603050405020304" pitchFamily="18" charset="0"/>
               </a:rPr>
-              <a:t>Itk </a:t>
+              <a:t>ITk</a:t>
             </a:r>
             <a:r>
               <a:rPr lang="en-US" b="1" dirty="0">
                 <a:latin typeface="Times New Roman" panose="02020603050405020304" pitchFamily="18" charset="0"/>
                 <a:cs typeface="Times New Roman" panose="02020603050405020304" pitchFamily="18" charset="0"/>
               </a:rPr>
-              <a:t>ASICs Register Converters</a:t>
+              <a:t> ASICs Register Converters</a:t>
             </a:r>
             <a:endParaRPr lang="en-US" dirty="0">
               <a:latin typeface="Times New Roman" panose="02020603050405020304" pitchFamily="18" charset="0"/>

</xml_diff>